<commit_message>
Uploaded Course Materials - Day 11.
</commit_message>
<xml_diff>
--- a/1. Core Java 8/Day 4/Slides/6. Class Inheritance/class-inheritance-slides.pptx
+++ b/1. Core Java 8/Day 4/Slides/6. Class Inheritance/class-inheritance-slides.pptx
@@ -17835,54 +17835,6 @@
           </a:custGeom>
           <a:solidFill>
             <a:srgbClr val="A62E5C"/>
-          </a:solidFill>
-        </p:spPr>
-        <p:txBody>
-          <a:bodyPr wrap="square" lIns="0" tIns="0" rIns="0" bIns="0" rtlCol="0"/>
-          <a:lstStyle/>
-          <a:p/>
-        </p:txBody>
-      </p:sp>
-      <p:sp>
-        <p:nvSpPr>
-          <p:cNvPr id="19" name="object 19"/>
-          <p:cNvSpPr/>
-          <p:nvPr/>
-        </p:nvSpPr>
-        <p:spPr>
-          <a:xfrm>
-            <a:off x="3241963" y="4106714"/>
-            <a:ext cx="2034539" cy="332740"/>
-          </a:xfrm>
-          <a:custGeom>
-            <a:avLst/>
-            <a:gdLst/>
-            <a:ahLst/>
-            <a:cxnLst/>
-            <a:rect l="l" t="t" r="r" b="b"/>
-            <a:pathLst>
-              <a:path w="2034539" h="332739">
-                <a:moveTo>
-                  <a:pt x="2034172" y="0"/>
-                </a:moveTo>
-                <a:lnTo>
-                  <a:pt x="0" y="0"/>
-                </a:lnTo>
-                <a:lnTo>
-                  <a:pt x="0" y="332510"/>
-                </a:lnTo>
-                <a:lnTo>
-                  <a:pt x="2034172" y="332510"/>
-                </a:lnTo>
-                <a:lnTo>
-                  <a:pt x="2034172" y="0"/>
-                </a:lnTo>
-                <a:close/>
-              </a:path>
-            </a:pathLst>
-          </a:custGeom>
-          <a:solidFill>
-            <a:srgbClr val="171717"/>
           </a:solidFill>
         </p:spPr>
         <p:txBody>

</xml_diff>